<commit_message>
Spot light facing straight down
</commit_message>
<xml_diff>
--- a/Classes_in_C++/The C++ compiler might hate you - classes in C++.pptx
+++ b/Classes_in_C++/The C++ compiler might hate you - classes in C++.pptx
@@ -6,7 +6,10 @@
   </p:sldMasterIdLst>
   <p:sldIdLst>
     <p:sldId id="256" r:id="rId2"/>
-    <p:sldId id="257" r:id="rId3"/>
+    <p:sldId id="258" r:id="rId3"/>
+    <p:sldId id="259" r:id="rId4"/>
+    <p:sldId id="257" r:id="rId5"/>
+    <p:sldId id="260" r:id="rId6"/>
   </p:sldIdLst>
   <p:sldSz cx="12192000" cy="6858000"/>
   <p:notesSz cx="6858000" cy="9144000"/>
@@ -105,6 +108,11 @@
       </a:defRPr>
     </a:lvl9pPr>
   </p:defaultTextStyle>
+  <p:extLst>
+    <p:ext uri="{EFAFB233-063F-42B5-8137-9DF3F51BA10A}">
+      <p15:sldGuideLst xmlns:p15="http://schemas.microsoft.com/office/powerpoint/2012/main"/>
+    </p:ext>
+  </p:extLst>
 </p:presentation>
 </file>
 
@@ -3598,6 +3606,969 @@
       </p:grpSpPr>
       <p:sp>
         <p:nvSpPr>
+          <p:cNvPr id="6" name="TextBox 5">
+            <a:extLst>
+              <a:ext uri="{FF2B5EF4-FFF2-40B4-BE49-F238E27FC236}">
+                <a16:creationId xmlns:a16="http://schemas.microsoft.com/office/drawing/2014/main" id="{A9A0F50D-C901-218B-F7A1-653BB6DF25D2}"/>
+              </a:ext>
+            </a:extLst>
+          </p:cNvPr>
+          <p:cNvSpPr txBox="1"/>
+          <p:nvPr/>
+        </p:nvSpPr>
+        <p:spPr>
+          <a:xfrm>
+            <a:off x="6348549" y="1720840"/>
+            <a:ext cx="4937760" cy="3416320"/>
+          </a:xfrm>
+          <a:prstGeom prst="rect">
+            <a:avLst/>
+          </a:prstGeom>
+          <a:noFill/>
+        </p:spPr>
+        <p:txBody>
+          <a:bodyPr wrap="square" rtlCol="0">
+            <a:spAutoFit/>
+          </a:bodyPr>
+          <a:lstStyle/>
+          <a:p>
+            <a:r>
+              <a:rPr lang="en-CA" dirty="0"/>
+              <a:t>A </a:t>
+            </a:r>
+            <a:r>
+              <a:rPr lang="en-CA" dirty="0" err="1"/>
+              <a:t>cRabbit</a:t>
+            </a:r>
+            <a:r>
+              <a:rPr lang="en-CA" dirty="0"/>
+              <a:t> “is a” </a:t>
+            </a:r>
+            <a:r>
+              <a:rPr lang="en-CA" dirty="0" err="1"/>
+              <a:t>cAnimal</a:t>
+            </a:r>
+            <a:r>
+              <a:rPr lang="en-CA" dirty="0"/>
+              <a:t> : use inheritance </a:t>
+            </a:r>
+          </a:p>
+          <a:p>
+            <a:endParaRPr lang="en-CA" dirty="0"/>
+          </a:p>
+          <a:p>
+            <a:r>
+              <a:rPr lang="en-CA" dirty="0" err="1"/>
+              <a:t>cWolf</a:t>
+            </a:r>
+            <a:r>
+              <a:rPr lang="en-CA" dirty="0"/>
+              <a:t> is a “derived” class from </a:t>
+            </a:r>
+            <a:r>
+              <a:rPr lang="en-CA" dirty="0" err="1"/>
+              <a:t>cAnimal</a:t>
+            </a:r>
+            <a:r>
+              <a:rPr lang="en-CA" dirty="0"/>
+              <a:t>.</a:t>
+            </a:r>
+          </a:p>
+          <a:p>
+            <a:r>
+              <a:rPr lang="en-CA" dirty="0" err="1"/>
+              <a:t>cAnimal</a:t>
+            </a:r>
+            <a:r>
+              <a:rPr lang="en-CA" dirty="0"/>
+              <a:t> is the “base” class of </a:t>
+            </a:r>
+            <a:r>
+              <a:rPr lang="en-CA" dirty="0" err="1"/>
+              <a:t>cWolf</a:t>
+            </a:r>
+            <a:r>
+              <a:rPr lang="en-CA" dirty="0"/>
+              <a:t>.</a:t>
+            </a:r>
+          </a:p>
+          <a:p>
+            <a:endParaRPr lang="en-CA" dirty="0"/>
+          </a:p>
+          <a:p>
+            <a:endParaRPr lang="en-CA" dirty="0"/>
+          </a:p>
+          <a:p>
+            <a:endParaRPr lang="en-CA" dirty="0"/>
+          </a:p>
+          <a:p>
+            <a:endParaRPr lang="en-CA" dirty="0"/>
+          </a:p>
+          <a:p>
+            <a:endParaRPr lang="en-CA" dirty="0"/>
+          </a:p>
+          <a:p>
+            <a:r>
+              <a:rPr lang="en-CA" dirty="0"/>
+              <a:t>(Note this is the opposite of Java:</a:t>
+            </a:r>
+          </a:p>
+          <a:p>
+            <a:r>
+              <a:rPr lang="en-CA" dirty="0"/>
+              <a:t>Super class</a:t>
+            </a:r>
+          </a:p>
+          <a:p>
+            <a:r>
+              <a:rPr lang="en-CA" dirty="0"/>
+              <a:t>Accessors and Mutators: Getters and Setters)</a:t>
+            </a:r>
+          </a:p>
+        </p:txBody>
+      </p:sp>
+      <p:sp>
+        <p:nvSpPr>
+          <p:cNvPr id="7" name="Rectangle 6">
+            <a:extLst>
+              <a:ext uri="{FF2B5EF4-FFF2-40B4-BE49-F238E27FC236}">
+                <a16:creationId xmlns:a16="http://schemas.microsoft.com/office/drawing/2014/main" id="{D00541DD-5E4E-F3A8-04FF-F49C07AFAB47}"/>
+              </a:ext>
+            </a:extLst>
+          </p:cNvPr>
+          <p:cNvSpPr/>
+          <p:nvPr/>
+        </p:nvSpPr>
+        <p:spPr>
+          <a:xfrm>
+            <a:off x="2838993" y="1015446"/>
+            <a:ext cx="1907178" cy="1410788"/>
+          </a:xfrm>
+          <a:prstGeom prst="rect">
+            <a:avLst/>
+          </a:prstGeom>
+        </p:spPr>
+        <p:style>
+          <a:lnRef idx="2">
+            <a:schemeClr val="accent1">
+              <a:shade val="50000"/>
+            </a:schemeClr>
+          </a:lnRef>
+          <a:fillRef idx="1">
+            <a:schemeClr val="accent1"/>
+          </a:fillRef>
+          <a:effectRef idx="0">
+            <a:schemeClr val="accent1"/>
+          </a:effectRef>
+          <a:fontRef idx="minor">
+            <a:schemeClr val="lt1"/>
+          </a:fontRef>
+        </p:style>
+        <p:txBody>
+          <a:bodyPr rtlCol="0" anchor="ctr"/>
+          <a:lstStyle/>
+          <a:p>
+            <a:pPr algn="ctr"/>
+            <a:r>
+              <a:rPr lang="en-CA" dirty="0" err="1"/>
+              <a:t>cAnimal</a:t>
+            </a:r>
+            <a:endParaRPr lang="en-CA" dirty="0"/>
+          </a:p>
+          <a:p>
+            <a:pPr algn="ctr"/>
+            <a:r>
+              <a:rPr lang="en-CA" dirty="0" err="1"/>
+              <a:t>MakeSound</a:t>
+            </a:r>
+            <a:r>
+              <a:rPr lang="en-CA" dirty="0"/>
+              <a:t>()</a:t>
+            </a:r>
+          </a:p>
+        </p:txBody>
+      </p:sp>
+      <p:sp>
+        <p:nvSpPr>
+          <p:cNvPr id="8" name="Rectangle 7">
+            <a:extLst>
+              <a:ext uri="{FF2B5EF4-FFF2-40B4-BE49-F238E27FC236}">
+                <a16:creationId xmlns:a16="http://schemas.microsoft.com/office/drawing/2014/main" id="{E1D37E40-35F7-B57E-02B6-4B68C90C6D91}"/>
+              </a:ext>
+            </a:extLst>
+          </p:cNvPr>
+          <p:cNvSpPr/>
+          <p:nvPr/>
+        </p:nvSpPr>
+        <p:spPr>
+          <a:xfrm>
+            <a:off x="2838993" y="2426234"/>
+            <a:ext cx="1907178" cy="1410788"/>
+          </a:xfrm>
+          <a:prstGeom prst="rect">
+            <a:avLst/>
+          </a:prstGeom>
+        </p:spPr>
+        <p:style>
+          <a:lnRef idx="2">
+            <a:schemeClr val="accent1">
+              <a:shade val="50000"/>
+            </a:schemeClr>
+          </a:lnRef>
+          <a:fillRef idx="1">
+            <a:schemeClr val="accent1"/>
+          </a:fillRef>
+          <a:effectRef idx="0">
+            <a:schemeClr val="accent1"/>
+          </a:effectRef>
+          <a:fontRef idx="minor">
+            <a:schemeClr val="lt1"/>
+          </a:fontRef>
+        </p:style>
+        <p:txBody>
+          <a:bodyPr rtlCol="0" anchor="ctr"/>
+          <a:lstStyle/>
+          <a:p>
+            <a:pPr algn="ctr"/>
+            <a:r>
+              <a:rPr lang="en-CA" dirty="0" err="1"/>
+              <a:t>cRabbit</a:t>
+            </a:r>
+            <a:endParaRPr lang="en-CA" dirty="0"/>
+          </a:p>
+          <a:p>
+            <a:pPr algn="ctr"/>
+            <a:r>
+              <a:rPr lang="en-CA" dirty="0" err="1"/>
+              <a:t>MakeSound</a:t>
+            </a:r>
+            <a:r>
+              <a:rPr lang="en-CA" dirty="0"/>
+              <a:t>()</a:t>
+            </a:r>
+          </a:p>
+          <a:p>
+            <a:pPr algn="ctr"/>
+            <a:endParaRPr lang="en-CA" dirty="0"/>
+          </a:p>
+        </p:txBody>
+      </p:sp>
+      <p:sp>
+        <p:nvSpPr>
+          <p:cNvPr id="9" name="Rectangle 8">
+            <a:extLst>
+              <a:ext uri="{FF2B5EF4-FFF2-40B4-BE49-F238E27FC236}">
+                <a16:creationId xmlns:a16="http://schemas.microsoft.com/office/drawing/2014/main" id="{09B9F820-A29B-4643-CD03-49DDD65CAB3D}"/>
+              </a:ext>
+            </a:extLst>
+          </p:cNvPr>
+          <p:cNvSpPr/>
+          <p:nvPr/>
+        </p:nvSpPr>
+        <p:spPr>
+          <a:xfrm>
+            <a:off x="2838993" y="3837022"/>
+            <a:ext cx="1907178" cy="1410788"/>
+          </a:xfrm>
+          <a:prstGeom prst="rect">
+            <a:avLst/>
+          </a:prstGeom>
+        </p:spPr>
+        <p:style>
+          <a:lnRef idx="2">
+            <a:schemeClr val="accent1">
+              <a:shade val="50000"/>
+            </a:schemeClr>
+          </a:lnRef>
+          <a:fillRef idx="1">
+            <a:schemeClr val="accent1"/>
+          </a:fillRef>
+          <a:effectRef idx="0">
+            <a:schemeClr val="accent1"/>
+          </a:effectRef>
+          <a:fontRef idx="minor">
+            <a:schemeClr val="lt1"/>
+          </a:fontRef>
+        </p:style>
+        <p:txBody>
+          <a:bodyPr rtlCol="0" anchor="ctr"/>
+          <a:lstStyle/>
+          <a:p>
+            <a:pPr algn="ctr"/>
+            <a:r>
+              <a:rPr lang="en-CA" dirty="0" err="1"/>
+              <a:t>cSuperRabit</a:t>
+            </a:r>
+            <a:endParaRPr lang="en-CA" dirty="0"/>
+          </a:p>
+          <a:p>
+            <a:pPr algn="ctr"/>
+            <a:r>
+              <a:rPr lang="en-CA" dirty="0" err="1"/>
+              <a:t>MakeSound</a:t>
+            </a:r>
+            <a:r>
+              <a:rPr lang="en-CA" dirty="0"/>
+              <a:t>()</a:t>
+            </a:r>
+          </a:p>
+          <a:p>
+            <a:pPr algn="ctr"/>
+            <a:endParaRPr lang="en-CA" dirty="0"/>
+          </a:p>
+        </p:txBody>
+      </p:sp>
+      <p:cxnSp>
+        <p:nvCxnSpPr>
+          <p:cNvPr id="10" name="Straight Arrow Connector 9">
+            <a:extLst>
+              <a:ext uri="{FF2B5EF4-FFF2-40B4-BE49-F238E27FC236}">
+                <a16:creationId xmlns:a16="http://schemas.microsoft.com/office/drawing/2014/main" id="{E0F59F00-9733-2133-D0E5-FCDF99F0D126}"/>
+              </a:ext>
+            </a:extLst>
+          </p:cNvPr>
+          <p:cNvCxnSpPr/>
+          <p:nvPr/>
+        </p:nvCxnSpPr>
+        <p:spPr>
+          <a:xfrm>
+            <a:off x="313508" y="1889760"/>
+            <a:ext cx="2525485" cy="0"/>
+          </a:xfrm>
+          <a:prstGeom prst="straightConnector1">
+            <a:avLst/>
+          </a:prstGeom>
+          <a:ln w="88900">
+            <a:headEnd type="none"/>
+            <a:tailEnd type="arrow"/>
+          </a:ln>
+        </p:spPr>
+        <p:style>
+          <a:lnRef idx="1">
+            <a:schemeClr val="accent1"/>
+          </a:lnRef>
+          <a:fillRef idx="0">
+            <a:schemeClr val="accent1"/>
+          </a:fillRef>
+          <a:effectRef idx="0">
+            <a:schemeClr val="accent1"/>
+          </a:effectRef>
+          <a:fontRef idx="minor">
+            <a:schemeClr val="tx1"/>
+          </a:fontRef>
+        </p:style>
+      </p:cxnSp>
+      <p:cxnSp>
+        <p:nvCxnSpPr>
+          <p:cNvPr id="11" name="Straight Arrow Connector 10">
+            <a:extLst>
+              <a:ext uri="{FF2B5EF4-FFF2-40B4-BE49-F238E27FC236}">
+                <a16:creationId xmlns:a16="http://schemas.microsoft.com/office/drawing/2014/main" id="{244B4987-C34E-956A-7B47-724610655306}"/>
+              </a:ext>
+            </a:extLst>
+          </p:cNvPr>
+          <p:cNvCxnSpPr/>
+          <p:nvPr/>
+        </p:nvCxnSpPr>
+        <p:spPr>
+          <a:xfrm>
+            <a:off x="313508" y="3100251"/>
+            <a:ext cx="2525485" cy="0"/>
+          </a:xfrm>
+          <a:prstGeom prst="straightConnector1">
+            <a:avLst/>
+          </a:prstGeom>
+          <a:ln w="88900">
+            <a:headEnd type="none"/>
+            <a:tailEnd type="arrow"/>
+          </a:ln>
+        </p:spPr>
+        <p:style>
+          <a:lnRef idx="1">
+            <a:schemeClr val="accent1"/>
+          </a:lnRef>
+          <a:fillRef idx="0">
+            <a:schemeClr val="accent1"/>
+          </a:fillRef>
+          <a:effectRef idx="0">
+            <a:schemeClr val="accent1"/>
+          </a:effectRef>
+          <a:fontRef idx="minor">
+            <a:schemeClr val="tx1"/>
+          </a:fontRef>
+        </p:style>
+      </p:cxnSp>
+      <p:cxnSp>
+        <p:nvCxnSpPr>
+          <p:cNvPr id="12" name="Straight Arrow Connector 11">
+            <a:extLst>
+              <a:ext uri="{FF2B5EF4-FFF2-40B4-BE49-F238E27FC236}">
+                <a16:creationId xmlns:a16="http://schemas.microsoft.com/office/drawing/2014/main" id="{FDB1585B-3DB0-F08B-32C2-19619D93EAD9}"/>
+              </a:ext>
+            </a:extLst>
+          </p:cNvPr>
+          <p:cNvCxnSpPr/>
+          <p:nvPr/>
+        </p:nvCxnSpPr>
+        <p:spPr>
+          <a:xfrm>
+            <a:off x="313508" y="4458788"/>
+            <a:ext cx="2525485" cy="0"/>
+          </a:xfrm>
+          <a:prstGeom prst="straightConnector1">
+            <a:avLst/>
+          </a:prstGeom>
+          <a:ln w="88900">
+            <a:headEnd type="none"/>
+            <a:tailEnd type="arrow"/>
+          </a:ln>
+        </p:spPr>
+        <p:style>
+          <a:lnRef idx="1">
+            <a:schemeClr val="accent1"/>
+          </a:lnRef>
+          <a:fillRef idx="0">
+            <a:schemeClr val="accent1"/>
+          </a:fillRef>
+          <a:effectRef idx="0">
+            <a:schemeClr val="accent1"/>
+          </a:effectRef>
+          <a:fontRef idx="minor">
+            <a:schemeClr val="tx1"/>
+          </a:fontRef>
+        </p:style>
+      </p:cxnSp>
+    </p:spTree>
+    <p:extLst>
+      <p:ext uri="{BB962C8B-B14F-4D97-AF65-F5344CB8AC3E}">
+        <p14:creationId xmlns:p14="http://schemas.microsoft.com/office/powerpoint/2010/main" val="597151785"/>
+      </p:ext>
+    </p:extLst>
+  </p:cSld>
+  <p:clrMapOvr>
+    <a:masterClrMapping/>
+  </p:clrMapOvr>
+</p:sld>
+</file>
+
+<file path=ppt/slides/slide3.xml><?xml version="1.0" encoding="utf-8"?>
+<p:sld xmlns:a="http://schemas.openxmlformats.org/drawingml/2006/main" xmlns:r="http://schemas.openxmlformats.org/officeDocument/2006/relationships" xmlns:p="http://schemas.openxmlformats.org/presentationml/2006/main">
+  <p:cSld>
+    <p:spTree>
+      <p:nvGrpSpPr>
+        <p:cNvPr id="1" name=""/>
+        <p:cNvGrpSpPr/>
+        <p:nvPr/>
+      </p:nvGrpSpPr>
+      <p:grpSpPr>
+        <a:xfrm>
+          <a:off x="0" y="0"/>
+          <a:ext cx="0" cy="0"/>
+          <a:chOff x="0" y="0"/>
+          <a:chExt cx="0" cy="0"/>
+        </a:xfrm>
+      </p:grpSpPr>
+      <p:sp>
+        <p:nvSpPr>
+          <p:cNvPr id="4" name="Rectangle 3">
+            <a:extLst>
+              <a:ext uri="{FF2B5EF4-FFF2-40B4-BE49-F238E27FC236}">
+                <a16:creationId xmlns:a16="http://schemas.microsoft.com/office/drawing/2014/main" id="{6440D8A2-8BCF-377C-C3A4-7FA1DE6447C0}"/>
+              </a:ext>
+            </a:extLst>
+          </p:cNvPr>
+          <p:cNvSpPr/>
+          <p:nvPr/>
+        </p:nvSpPr>
+        <p:spPr>
+          <a:xfrm>
+            <a:off x="4188822" y="1219200"/>
+            <a:ext cx="1907178" cy="1410788"/>
+          </a:xfrm>
+          <a:prstGeom prst="rect">
+            <a:avLst/>
+          </a:prstGeom>
+        </p:spPr>
+        <p:style>
+          <a:lnRef idx="2">
+            <a:schemeClr val="accent1">
+              <a:shade val="50000"/>
+            </a:schemeClr>
+          </a:lnRef>
+          <a:fillRef idx="1">
+            <a:schemeClr val="accent1"/>
+          </a:fillRef>
+          <a:effectRef idx="0">
+            <a:schemeClr val="accent1"/>
+          </a:effectRef>
+          <a:fontRef idx="minor">
+            <a:schemeClr val="lt1"/>
+          </a:fontRef>
+        </p:style>
+        <p:txBody>
+          <a:bodyPr rtlCol="0" anchor="ctr"/>
+          <a:lstStyle/>
+          <a:p>
+            <a:pPr algn="ctr"/>
+            <a:r>
+              <a:rPr lang="en-CA" dirty="0" err="1"/>
+              <a:t>cAnimal</a:t>
+            </a:r>
+            <a:endParaRPr lang="en-CA" dirty="0"/>
+          </a:p>
+          <a:p>
+            <a:pPr algn="ctr"/>
+            <a:r>
+              <a:rPr lang="en-CA" dirty="0" err="1"/>
+              <a:t>MakeSound</a:t>
+            </a:r>
+            <a:r>
+              <a:rPr lang="en-CA" dirty="0"/>
+              <a:t>()</a:t>
+            </a:r>
+          </a:p>
+        </p:txBody>
+      </p:sp>
+      <p:sp>
+        <p:nvSpPr>
+          <p:cNvPr id="5" name="Rectangle 4">
+            <a:extLst>
+              <a:ext uri="{FF2B5EF4-FFF2-40B4-BE49-F238E27FC236}">
+                <a16:creationId xmlns:a16="http://schemas.microsoft.com/office/drawing/2014/main" id="{CA4B5E77-4DFD-77E4-047A-16044FBDB210}"/>
+              </a:ext>
+            </a:extLst>
+          </p:cNvPr>
+          <p:cNvSpPr/>
+          <p:nvPr/>
+        </p:nvSpPr>
+        <p:spPr>
+          <a:xfrm>
+            <a:off x="4188822" y="2629988"/>
+            <a:ext cx="1907178" cy="1410788"/>
+          </a:xfrm>
+          <a:prstGeom prst="rect">
+            <a:avLst/>
+          </a:prstGeom>
+        </p:spPr>
+        <p:style>
+          <a:lnRef idx="2">
+            <a:schemeClr val="accent1">
+              <a:shade val="50000"/>
+            </a:schemeClr>
+          </a:lnRef>
+          <a:fillRef idx="1">
+            <a:schemeClr val="accent1"/>
+          </a:fillRef>
+          <a:effectRef idx="0">
+            <a:schemeClr val="accent1"/>
+          </a:effectRef>
+          <a:fontRef idx="minor">
+            <a:schemeClr val="lt1"/>
+          </a:fontRef>
+        </p:style>
+        <p:txBody>
+          <a:bodyPr rtlCol="0" anchor="ctr"/>
+          <a:lstStyle/>
+          <a:p>
+            <a:pPr algn="ctr"/>
+            <a:r>
+              <a:rPr lang="en-CA" dirty="0" err="1"/>
+              <a:t>cRabbit</a:t>
+            </a:r>
+            <a:endParaRPr lang="en-CA" dirty="0"/>
+          </a:p>
+          <a:p>
+            <a:pPr algn="ctr"/>
+            <a:r>
+              <a:rPr lang="en-CA" dirty="0" err="1"/>
+              <a:t>MakeSound</a:t>
+            </a:r>
+            <a:r>
+              <a:rPr lang="en-CA" dirty="0"/>
+              <a:t>()</a:t>
+            </a:r>
+          </a:p>
+          <a:p>
+            <a:pPr algn="ctr"/>
+            <a:endParaRPr lang="en-CA" dirty="0"/>
+          </a:p>
+        </p:txBody>
+      </p:sp>
+      <p:sp>
+        <p:nvSpPr>
+          <p:cNvPr id="6" name="TextBox 5">
+            <a:extLst>
+              <a:ext uri="{FF2B5EF4-FFF2-40B4-BE49-F238E27FC236}">
+                <a16:creationId xmlns:a16="http://schemas.microsoft.com/office/drawing/2014/main" id="{A9A0F50D-C901-218B-F7A1-653BB6DF25D2}"/>
+              </a:ext>
+            </a:extLst>
+          </p:cNvPr>
+          <p:cNvSpPr txBox="1"/>
+          <p:nvPr/>
+        </p:nvSpPr>
+        <p:spPr>
+          <a:xfrm>
+            <a:off x="6348549" y="1720840"/>
+            <a:ext cx="4937760" cy="1477328"/>
+          </a:xfrm>
+          <a:prstGeom prst="rect">
+            <a:avLst/>
+          </a:prstGeom>
+          <a:noFill/>
+        </p:spPr>
+        <p:txBody>
+          <a:bodyPr wrap="square" rtlCol="0">
+            <a:spAutoFit/>
+          </a:bodyPr>
+          <a:lstStyle/>
+          <a:p>
+            <a:r>
+              <a:rPr lang="en-CA" dirty="0"/>
+              <a:t>If there is a “virtual’ ANYWHERE in the chain of inheritance, then it will compile it completely differently, using a “v-table”</a:t>
+            </a:r>
+          </a:p>
+          <a:p>
+            <a:endParaRPr lang="en-CA" dirty="0"/>
+          </a:p>
+          <a:p>
+            <a:r>
+              <a:rPr lang="en-CA" dirty="0" err="1"/>
+              <a:t>Vitual</a:t>
+            </a:r>
+            <a:r>
+              <a:rPr lang="en-CA" dirty="0"/>
+              <a:t> function loop up table</a:t>
+            </a:r>
+          </a:p>
+        </p:txBody>
+      </p:sp>
+      <p:sp>
+        <p:nvSpPr>
+          <p:cNvPr id="2" name="Rectangle 1">
+            <a:extLst>
+              <a:ext uri="{FF2B5EF4-FFF2-40B4-BE49-F238E27FC236}">
+                <a16:creationId xmlns:a16="http://schemas.microsoft.com/office/drawing/2014/main" id="{24182A08-1F5C-D005-A675-337C8C3AA358}"/>
+              </a:ext>
+            </a:extLst>
+          </p:cNvPr>
+          <p:cNvSpPr/>
+          <p:nvPr/>
+        </p:nvSpPr>
+        <p:spPr>
+          <a:xfrm>
+            <a:off x="4188822" y="4040776"/>
+            <a:ext cx="1907178" cy="1410788"/>
+          </a:xfrm>
+          <a:prstGeom prst="rect">
+            <a:avLst/>
+          </a:prstGeom>
+        </p:spPr>
+        <p:style>
+          <a:lnRef idx="2">
+            <a:schemeClr val="accent1">
+              <a:shade val="50000"/>
+            </a:schemeClr>
+          </a:lnRef>
+          <a:fillRef idx="1">
+            <a:schemeClr val="accent1"/>
+          </a:fillRef>
+          <a:effectRef idx="0">
+            <a:schemeClr val="accent1"/>
+          </a:effectRef>
+          <a:fontRef idx="minor">
+            <a:schemeClr val="lt1"/>
+          </a:fontRef>
+        </p:style>
+        <p:txBody>
+          <a:bodyPr rtlCol="0" anchor="ctr"/>
+          <a:lstStyle/>
+          <a:p>
+            <a:pPr algn="ctr"/>
+            <a:r>
+              <a:rPr lang="en-CA" dirty="0" err="1"/>
+              <a:t>cSuperRabit</a:t>
+            </a:r>
+            <a:endParaRPr lang="en-CA" dirty="0"/>
+          </a:p>
+          <a:p>
+            <a:pPr algn="ctr"/>
+            <a:r>
+              <a:rPr lang="en-CA" dirty="0" err="1"/>
+              <a:t>MakeSound</a:t>
+            </a:r>
+            <a:r>
+              <a:rPr lang="en-CA" dirty="0"/>
+              <a:t>()</a:t>
+            </a:r>
+          </a:p>
+          <a:p>
+            <a:pPr algn="ctr"/>
+            <a:endParaRPr lang="en-CA" dirty="0"/>
+          </a:p>
+        </p:txBody>
+      </p:sp>
+      <p:sp>
+        <p:nvSpPr>
+          <p:cNvPr id="3" name="Rectangle 2">
+            <a:extLst>
+              <a:ext uri="{FF2B5EF4-FFF2-40B4-BE49-F238E27FC236}">
+                <a16:creationId xmlns:a16="http://schemas.microsoft.com/office/drawing/2014/main" id="{7DDEF664-FFF3-21D2-87D3-DDD429B6D7CB}"/>
+              </a:ext>
+            </a:extLst>
+          </p:cNvPr>
+          <p:cNvSpPr/>
+          <p:nvPr/>
+        </p:nvSpPr>
+        <p:spPr>
+          <a:xfrm>
+            <a:off x="252549" y="1645920"/>
+            <a:ext cx="2307772" cy="1959428"/>
+          </a:xfrm>
+          <a:prstGeom prst="rect">
+            <a:avLst/>
+          </a:prstGeom>
+        </p:spPr>
+        <p:style>
+          <a:lnRef idx="2">
+            <a:schemeClr val="accent1">
+              <a:shade val="50000"/>
+            </a:schemeClr>
+          </a:lnRef>
+          <a:fillRef idx="1">
+            <a:schemeClr val="accent1"/>
+          </a:fillRef>
+          <a:effectRef idx="0">
+            <a:schemeClr val="accent1"/>
+          </a:effectRef>
+          <a:fontRef idx="minor">
+            <a:schemeClr val="lt1"/>
+          </a:fontRef>
+        </p:style>
+        <p:txBody>
+          <a:bodyPr rtlCol="0" anchor="ctr"/>
+          <a:lstStyle/>
+          <a:p>
+            <a:pPr algn="ctr"/>
+            <a:r>
+              <a:rPr lang="en-CA" dirty="0"/>
+              <a:t>V-table</a:t>
+            </a:r>
+          </a:p>
+          <a:p>
+            <a:pPr algn="ctr"/>
+            <a:r>
+              <a:rPr lang="en-CA" dirty="0" err="1"/>
+              <a:t>MakeSound</a:t>
+            </a:r>
+            <a:r>
+              <a:rPr lang="en-CA" dirty="0"/>
+              <a:t>()</a:t>
+            </a:r>
+          </a:p>
+          <a:p>
+            <a:pPr algn="ctr"/>
+            <a:r>
+              <a:rPr lang="en-CA" dirty="0" err="1"/>
+              <a:t>Aniaml</a:t>
+            </a:r>
+            <a:r>
+              <a:rPr lang="en-CA" dirty="0">
+                <a:sym typeface="Wingdings" panose="05000000000000000000" pitchFamily="2" charset="2"/>
+              </a:rPr>
+              <a:t> </a:t>
+            </a:r>
+          </a:p>
+          <a:p>
+            <a:pPr algn="ctr"/>
+            <a:r>
+              <a:rPr lang="en-CA" dirty="0">
+                <a:sym typeface="Wingdings" panose="05000000000000000000" pitchFamily="2" charset="2"/>
+              </a:rPr>
+              <a:t>Wolf</a:t>
+            </a:r>
+          </a:p>
+          <a:p>
+            <a:pPr algn="ctr"/>
+            <a:r>
+              <a:rPr lang="en-CA" dirty="0">
+                <a:sym typeface="Wingdings" panose="05000000000000000000" pitchFamily="2" charset="2"/>
+              </a:rPr>
+              <a:t>Rabbit</a:t>
+            </a:r>
+            <a:endParaRPr lang="en-CA" dirty="0"/>
+          </a:p>
+        </p:txBody>
+      </p:sp>
+      <p:cxnSp>
+        <p:nvCxnSpPr>
+          <p:cNvPr id="7" name="Straight Arrow Connector 6">
+            <a:extLst>
+              <a:ext uri="{FF2B5EF4-FFF2-40B4-BE49-F238E27FC236}">
+                <a16:creationId xmlns:a16="http://schemas.microsoft.com/office/drawing/2014/main" id="{5B4708FF-5BF6-1CC6-6373-BE3F2B788043}"/>
+              </a:ext>
+            </a:extLst>
+          </p:cNvPr>
+          <p:cNvCxnSpPr>
+            <a:cxnSpLocks/>
+            <a:endCxn id="4" idx="1"/>
+          </p:cNvCxnSpPr>
+          <p:nvPr/>
+        </p:nvCxnSpPr>
+        <p:spPr>
+          <a:xfrm flipV="1">
+            <a:off x="1850571" y="1924594"/>
+            <a:ext cx="2338251" cy="701040"/>
+          </a:xfrm>
+          <a:prstGeom prst="straightConnector1">
+            <a:avLst/>
+          </a:prstGeom>
+          <a:ln w="88900">
+            <a:solidFill>
+              <a:srgbClr val="FF0000"/>
+            </a:solidFill>
+            <a:headEnd type="none"/>
+            <a:tailEnd type="arrow"/>
+          </a:ln>
+        </p:spPr>
+        <p:style>
+          <a:lnRef idx="1">
+            <a:schemeClr val="accent1"/>
+          </a:lnRef>
+          <a:fillRef idx="0">
+            <a:schemeClr val="accent1"/>
+          </a:fillRef>
+          <a:effectRef idx="0">
+            <a:schemeClr val="accent1"/>
+          </a:effectRef>
+          <a:fontRef idx="minor">
+            <a:schemeClr val="tx1"/>
+          </a:fontRef>
+        </p:style>
+      </p:cxnSp>
+      <p:cxnSp>
+        <p:nvCxnSpPr>
+          <p:cNvPr id="14" name="Straight Arrow Connector 13">
+            <a:extLst>
+              <a:ext uri="{FF2B5EF4-FFF2-40B4-BE49-F238E27FC236}">
+                <a16:creationId xmlns:a16="http://schemas.microsoft.com/office/drawing/2014/main" id="{95B3B3D6-EBAB-F258-7276-44E8516FB020}"/>
+              </a:ext>
+            </a:extLst>
+          </p:cNvPr>
+          <p:cNvCxnSpPr>
+            <a:cxnSpLocks/>
+            <a:endCxn id="5" idx="1"/>
+          </p:cNvCxnSpPr>
+          <p:nvPr/>
+        </p:nvCxnSpPr>
+        <p:spPr>
+          <a:xfrm>
+            <a:off x="1850571" y="3198168"/>
+            <a:ext cx="2338251" cy="137214"/>
+          </a:xfrm>
+          <a:prstGeom prst="straightConnector1">
+            <a:avLst/>
+          </a:prstGeom>
+          <a:ln w="88900">
+            <a:solidFill>
+              <a:srgbClr val="FF0000"/>
+            </a:solidFill>
+            <a:headEnd type="none"/>
+            <a:tailEnd type="arrow"/>
+          </a:ln>
+        </p:spPr>
+        <p:style>
+          <a:lnRef idx="1">
+            <a:schemeClr val="accent1"/>
+          </a:lnRef>
+          <a:fillRef idx="0">
+            <a:schemeClr val="accent1"/>
+          </a:fillRef>
+          <a:effectRef idx="0">
+            <a:schemeClr val="accent1"/>
+          </a:effectRef>
+          <a:fontRef idx="minor">
+            <a:schemeClr val="tx1"/>
+          </a:fontRef>
+        </p:style>
+      </p:cxnSp>
+      <p:cxnSp>
+        <p:nvCxnSpPr>
+          <p:cNvPr id="17" name="Straight Arrow Connector 16">
+            <a:extLst>
+              <a:ext uri="{FF2B5EF4-FFF2-40B4-BE49-F238E27FC236}">
+                <a16:creationId xmlns:a16="http://schemas.microsoft.com/office/drawing/2014/main" id="{802FDD14-0D26-829D-4811-72E081380C71}"/>
+              </a:ext>
+            </a:extLst>
+          </p:cNvPr>
+          <p:cNvCxnSpPr>
+            <a:cxnSpLocks/>
+            <a:endCxn id="2" idx="1"/>
+          </p:cNvCxnSpPr>
+          <p:nvPr/>
+        </p:nvCxnSpPr>
+        <p:spPr>
+          <a:xfrm>
+            <a:off x="1850571" y="2914078"/>
+            <a:ext cx="2338251" cy="1832092"/>
+          </a:xfrm>
+          <a:prstGeom prst="straightConnector1">
+            <a:avLst/>
+          </a:prstGeom>
+          <a:ln w="88900">
+            <a:solidFill>
+              <a:srgbClr val="FF0000"/>
+            </a:solidFill>
+            <a:headEnd type="none"/>
+            <a:tailEnd type="arrow"/>
+          </a:ln>
+        </p:spPr>
+        <p:style>
+          <a:lnRef idx="1">
+            <a:schemeClr val="accent1"/>
+          </a:lnRef>
+          <a:fillRef idx="0">
+            <a:schemeClr val="accent1"/>
+          </a:fillRef>
+          <a:effectRef idx="0">
+            <a:schemeClr val="accent1"/>
+          </a:effectRef>
+          <a:fontRef idx="minor">
+            <a:schemeClr val="tx1"/>
+          </a:fontRef>
+        </p:style>
+      </p:cxnSp>
+    </p:spTree>
+    <p:extLst>
+      <p:ext uri="{BB962C8B-B14F-4D97-AF65-F5344CB8AC3E}">
+        <p14:creationId xmlns:p14="http://schemas.microsoft.com/office/powerpoint/2010/main" val="2850830998"/>
+      </p:ext>
+    </p:extLst>
+  </p:cSld>
+  <p:clrMapOvr>
+    <a:masterClrMapping/>
+  </p:clrMapOvr>
+</p:sld>
+</file>
+
+<file path=ppt/slides/slide4.xml><?xml version="1.0" encoding="utf-8"?>
+<p:sld xmlns:a="http://schemas.openxmlformats.org/drawingml/2006/main" xmlns:r="http://schemas.openxmlformats.org/officeDocument/2006/relationships" xmlns:p="http://schemas.openxmlformats.org/presentationml/2006/main">
+  <p:cSld>
+    <p:spTree>
+      <p:nvGrpSpPr>
+        <p:cNvPr id="1" name=""/>
+        <p:cNvGrpSpPr/>
+        <p:nvPr/>
+      </p:nvGrpSpPr>
+      <p:grpSpPr>
+        <a:xfrm>
+          <a:off x="0" y="0"/>
+          <a:ext cx="0" cy="0"/>
+          <a:chOff x="0" y="0"/>
+          <a:chExt cx="0" cy="0"/>
+        </a:xfrm>
+      </p:grpSpPr>
+      <p:sp>
+        <p:nvSpPr>
           <p:cNvPr id="4" name="Rectangle 3">
             <a:extLst>
               <a:ext uri="{FF2B5EF4-FFF2-40B4-BE49-F238E27FC236}">
@@ -3836,6 +4807,330 @@
     <p:extLst>
       <p:ext uri="{BB962C8B-B14F-4D97-AF65-F5344CB8AC3E}">
         <p14:creationId xmlns:p14="http://schemas.microsoft.com/office/powerpoint/2010/main" val="2847497307"/>
+      </p:ext>
+    </p:extLst>
+  </p:cSld>
+  <p:clrMapOvr>
+    <a:masterClrMapping/>
+  </p:clrMapOvr>
+</p:sld>
+</file>
+
+<file path=ppt/slides/slide5.xml><?xml version="1.0" encoding="utf-8"?>
+<p:sld xmlns:a="http://schemas.openxmlformats.org/drawingml/2006/main" xmlns:r="http://schemas.openxmlformats.org/officeDocument/2006/relationships" xmlns:p="http://schemas.openxmlformats.org/presentationml/2006/main">
+  <p:cSld>
+    <p:spTree>
+      <p:nvGrpSpPr>
+        <p:cNvPr id="1" name=""/>
+        <p:cNvGrpSpPr/>
+        <p:nvPr/>
+      </p:nvGrpSpPr>
+      <p:grpSpPr>
+        <a:xfrm>
+          <a:off x="0" y="0"/>
+          <a:ext cx="0" cy="0"/>
+          <a:chOff x="0" y="0"/>
+          <a:chExt cx="0" cy="0"/>
+        </a:xfrm>
+      </p:grpSpPr>
+      <p:sp>
+        <p:nvSpPr>
+          <p:cNvPr id="4" name="Rectangle 3">
+            <a:extLst>
+              <a:ext uri="{FF2B5EF4-FFF2-40B4-BE49-F238E27FC236}">
+                <a16:creationId xmlns:a16="http://schemas.microsoft.com/office/drawing/2014/main" id="{6440D8A2-8BCF-377C-C3A4-7FA1DE6447C0}"/>
+              </a:ext>
+            </a:extLst>
+          </p:cNvPr>
+          <p:cNvSpPr/>
+          <p:nvPr/>
+        </p:nvSpPr>
+        <p:spPr>
+          <a:xfrm>
+            <a:off x="4624976" y="1262260"/>
+            <a:ext cx="2795452" cy="1410788"/>
+          </a:xfrm>
+          <a:prstGeom prst="rect">
+            <a:avLst/>
+          </a:prstGeom>
+        </p:spPr>
+        <p:style>
+          <a:lnRef idx="2">
+            <a:schemeClr val="accent1">
+              <a:shade val="50000"/>
+            </a:schemeClr>
+          </a:lnRef>
+          <a:fillRef idx="1">
+            <a:schemeClr val="accent1"/>
+          </a:fillRef>
+          <a:effectRef idx="0">
+            <a:schemeClr val="accent1"/>
+          </a:effectRef>
+          <a:fontRef idx="minor">
+            <a:schemeClr val="lt1"/>
+          </a:fontRef>
+        </p:style>
+        <p:txBody>
+          <a:bodyPr rtlCol="0" anchor="ctr"/>
+          <a:lstStyle/>
+          <a:p>
+            <a:pPr algn="ctr"/>
+            <a:r>
+              <a:rPr lang="en-CA" dirty="0" err="1"/>
+              <a:t>cRabbit</a:t>
+            </a:r>
+            <a:endParaRPr lang="en-CA" dirty="0"/>
+          </a:p>
+        </p:txBody>
+      </p:sp>
+      <p:sp>
+        <p:nvSpPr>
+          <p:cNvPr id="5" name="Rectangle 4">
+            <a:extLst>
+              <a:ext uri="{FF2B5EF4-FFF2-40B4-BE49-F238E27FC236}">
+                <a16:creationId xmlns:a16="http://schemas.microsoft.com/office/drawing/2014/main" id="{CA4B5E77-4DFD-77E4-047A-16044FBDB210}"/>
+              </a:ext>
+            </a:extLst>
+          </p:cNvPr>
+          <p:cNvSpPr/>
+          <p:nvPr/>
+        </p:nvSpPr>
+        <p:spPr>
+          <a:xfrm>
+            <a:off x="734907" y="1262260"/>
+            <a:ext cx="2795452" cy="1410788"/>
+          </a:xfrm>
+          <a:prstGeom prst="rect">
+            <a:avLst/>
+          </a:prstGeom>
+        </p:spPr>
+        <p:style>
+          <a:lnRef idx="2">
+            <a:schemeClr val="accent1">
+              <a:shade val="50000"/>
+            </a:schemeClr>
+          </a:lnRef>
+          <a:fillRef idx="1">
+            <a:schemeClr val="accent1"/>
+          </a:fillRef>
+          <a:effectRef idx="0">
+            <a:schemeClr val="accent1"/>
+          </a:effectRef>
+          <a:fontRef idx="minor">
+            <a:schemeClr val="lt1"/>
+          </a:fontRef>
+        </p:style>
+        <p:txBody>
+          <a:bodyPr rtlCol="0" anchor="ctr"/>
+          <a:lstStyle/>
+          <a:p>
+            <a:pPr algn="ctr"/>
+            <a:r>
+              <a:rPr lang="en-CA" dirty="0" err="1"/>
+              <a:t>cSuperRabbit</a:t>
+            </a:r>
+            <a:endParaRPr lang="en-CA" dirty="0"/>
+          </a:p>
+        </p:txBody>
+      </p:sp>
+      <p:sp>
+        <p:nvSpPr>
+          <p:cNvPr id="6" name="TextBox 5">
+            <a:extLst>
+              <a:ext uri="{FF2B5EF4-FFF2-40B4-BE49-F238E27FC236}">
+                <a16:creationId xmlns:a16="http://schemas.microsoft.com/office/drawing/2014/main" id="{A9A0F50D-C901-218B-F7A1-653BB6DF25D2}"/>
+              </a:ext>
+            </a:extLst>
+          </p:cNvPr>
+          <p:cNvSpPr txBox="1"/>
+          <p:nvPr/>
+        </p:nvSpPr>
+        <p:spPr>
+          <a:xfrm>
+            <a:off x="2099007" y="3831026"/>
+            <a:ext cx="6748659" cy="1200329"/>
+          </a:xfrm>
+          <a:prstGeom prst="rect">
+            <a:avLst/>
+          </a:prstGeom>
+          <a:noFill/>
+        </p:spPr>
+        <p:txBody>
+          <a:bodyPr wrap="square" rtlCol="0">
+            <a:spAutoFit/>
+          </a:bodyPr>
+          <a:lstStyle/>
+          <a:p>
+            <a:r>
+              <a:rPr lang="en-CA" dirty="0"/>
+              <a:t>The right one is an “interface” class, hence the “</a:t>
+            </a:r>
+            <a:r>
+              <a:rPr lang="en-CA" dirty="0" err="1"/>
+              <a:t>i</a:t>
+            </a:r>
+            <a:r>
+              <a:rPr lang="en-CA" dirty="0"/>
+              <a:t>” </a:t>
+            </a:r>
+          </a:p>
+          <a:p>
+            <a:r>
+              <a:rPr lang="en-CA" dirty="0"/>
+              <a:t>It is a “pure virtual” class and has NO data and NO code in it. </a:t>
+            </a:r>
+          </a:p>
+          <a:p>
+            <a:r>
+              <a:rPr lang="en-CA" dirty="0"/>
+              <a:t>You will NEVER create one of these. </a:t>
+            </a:r>
+          </a:p>
+          <a:p>
+            <a:endParaRPr lang="en-CA" dirty="0"/>
+          </a:p>
+        </p:txBody>
+      </p:sp>
+      <p:cxnSp>
+        <p:nvCxnSpPr>
+          <p:cNvPr id="3" name="Straight Arrow Connector 2">
+            <a:extLst>
+              <a:ext uri="{FF2B5EF4-FFF2-40B4-BE49-F238E27FC236}">
+                <a16:creationId xmlns:a16="http://schemas.microsoft.com/office/drawing/2014/main" id="{62FB6225-EB93-18D4-6F72-DFD89B6310D8}"/>
+              </a:ext>
+            </a:extLst>
+          </p:cNvPr>
+          <p:cNvCxnSpPr>
+            <a:stCxn id="5" idx="3"/>
+            <a:endCxn id="4" idx="1"/>
+          </p:cNvCxnSpPr>
+          <p:nvPr/>
+        </p:nvCxnSpPr>
+        <p:spPr>
+          <a:xfrm>
+            <a:off x="3530359" y="1967654"/>
+            <a:ext cx="1094617" cy="0"/>
+          </a:xfrm>
+          <a:prstGeom prst="straightConnector1">
+            <a:avLst/>
+          </a:prstGeom>
+          <a:ln w="88900">
+            <a:headEnd type="none"/>
+            <a:tailEnd type="arrow"/>
+          </a:ln>
+        </p:spPr>
+        <p:style>
+          <a:lnRef idx="1">
+            <a:schemeClr val="accent1"/>
+          </a:lnRef>
+          <a:fillRef idx="0">
+            <a:schemeClr val="accent1"/>
+          </a:fillRef>
+          <a:effectRef idx="0">
+            <a:schemeClr val="accent1"/>
+          </a:effectRef>
+          <a:fontRef idx="minor">
+            <a:schemeClr val="tx1"/>
+          </a:fontRef>
+        </p:style>
+      </p:cxnSp>
+      <p:sp>
+        <p:nvSpPr>
+          <p:cNvPr id="8" name="Oval 7">
+            <a:extLst>
+              <a:ext uri="{FF2B5EF4-FFF2-40B4-BE49-F238E27FC236}">
+                <a16:creationId xmlns:a16="http://schemas.microsoft.com/office/drawing/2014/main" id="{CE35F517-F33A-77BE-2B4C-DE8E34730301}"/>
+              </a:ext>
+            </a:extLst>
+          </p:cNvPr>
+          <p:cNvSpPr/>
+          <p:nvPr/>
+        </p:nvSpPr>
+        <p:spPr>
+          <a:xfrm>
+            <a:off x="8976841" y="1262260"/>
+            <a:ext cx="1606491" cy="1311967"/>
+          </a:xfrm>
+          <a:prstGeom prst="ellipse">
+            <a:avLst/>
+          </a:prstGeom>
+        </p:spPr>
+        <p:style>
+          <a:lnRef idx="2">
+            <a:schemeClr val="accent1">
+              <a:shade val="50000"/>
+            </a:schemeClr>
+          </a:lnRef>
+          <a:fillRef idx="1">
+            <a:schemeClr val="accent1"/>
+          </a:fillRef>
+          <a:effectRef idx="0">
+            <a:schemeClr val="accent1"/>
+          </a:effectRef>
+          <a:fontRef idx="minor">
+            <a:schemeClr val="lt1"/>
+          </a:fontRef>
+        </p:style>
+        <p:txBody>
+          <a:bodyPr rtlCol="0" anchor="ctr"/>
+          <a:lstStyle/>
+          <a:p>
+            <a:pPr algn="ctr"/>
+            <a:r>
+              <a:rPr lang="en-CA" dirty="0" err="1"/>
+              <a:t>iAnimal</a:t>
+            </a:r>
+            <a:endParaRPr lang="en-CA" dirty="0"/>
+          </a:p>
+        </p:txBody>
+      </p:sp>
+      <p:cxnSp>
+        <p:nvCxnSpPr>
+          <p:cNvPr id="11" name="Straight Arrow Connector 10">
+            <a:extLst>
+              <a:ext uri="{FF2B5EF4-FFF2-40B4-BE49-F238E27FC236}">
+                <a16:creationId xmlns:a16="http://schemas.microsoft.com/office/drawing/2014/main" id="{E3EC0B01-FB97-F315-21F7-24D28A172F4E}"/>
+              </a:ext>
+            </a:extLst>
+          </p:cNvPr>
+          <p:cNvCxnSpPr>
+            <a:cxnSpLocks/>
+            <a:endCxn id="8" idx="2"/>
+          </p:cNvCxnSpPr>
+          <p:nvPr/>
+        </p:nvCxnSpPr>
+        <p:spPr>
+          <a:xfrm>
+            <a:off x="7174894" y="1904697"/>
+            <a:ext cx="1801947" cy="13547"/>
+          </a:xfrm>
+          <a:prstGeom prst="straightConnector1">
+            <a:avLst/>
+          </a:prstGeom>
+          <a:ln w="88900">
+            <a:headEnd type="none"/>
+            <a:tailEnd type="arrow"/>
+          </a:ln>
+        </p:spPr>
+        <p:style>
+          <a:lnRef idx="1">
+            <a:schemeClr val="accent1"/>
+          </a:lnRef>
+          <a:fillRef idx="0">
+            <a:schemeClr val="accent1"/>
+          </a:fillRef>
+          <a:effectRef idx="0">
+            <a:schemeClr val="accent1"/>
+          </a:effectRef>
+          <a:fontRef idx="minor">
+            <a:schemeClr val="tx1"/>
+          </a:fontRef>
+        </p:style>
+      </p:cxnSp>
+    </p:spTree>
+    <p:extLst>
+      <p:ext uri="{BB962C8B-B14F-4D97-AF65-F5344CB8AC3E}">
+        <p14:creationId xmlns:p14="http://schemas.microsoft.com/office/powerpoint/2010/main" val="410796414"/>
       </p:ext>
     </p:extLst>
   </p:cSld>

</xml_diff>